<commit_message>
Weekly reports and thesis files.
</commit_message>
<xml_diff>
--- a/Weekly Reports/2020.03.23- 2020.03.30.pptx
+++ b/Weekly Reports/2020.03.23- 2020.03.30.pptx
@@ -5,7 +5,7 @@
     <p:sldMasterId id="2147483648" r:id="rId1"/>
   </p:sldMasterIdLst>
   <p:notesMasterIdLst>
-    <p:notesMasterId r:id="rId8"/>
+    <p:notesMasterId r:id="rId9"/>
   </p:notesMasterIdLst>
   <p:sldIdLst>
     <p:sldId id="288" r:id="rId2"/>
@@ -14,6 +14,7 @@
     <p:sldId id="290" r:id="rId5"/>
     <p:sldId id="291" r:id="rId6"/>
     <p:sldId id="292" r:id="rId7"/>
+    <p:sldId id="293" r:id="rId8"/>
   </p:sldIdLst>
   <p:sldSz cx="12192000" cy="6858000"/>
   <p:notesSz cx="6858000" cy="9144000"/>
@@ -202,7 +203,7 @@
           <a:p>
             <a:fld id="{6967AB47-6931-48C6-B7ED-326D1228AFBA}" type="datetimeFigureOut">
               <a:rPr lang="tr-TR" smtClean="0"/>
-              <a:t>24.03.2020</a:t>
+              <a:t>30.03.2020</a:t>
             </a:fld>
             <a:endParaRPr lang="tr-TR"/>
           </a:p>
@@ -601,7 +602,7 @@
           <a:p>
             <a:fld id="{BD3B3769-65FE-41EA-85B6-D9F2AF76CBA9}" type="datetime1">
               <a:rPr lang="tr-TR" smtClean="0"/>
-              <a:t>24.03.2020</a:t>
+              <a:t>30.03.2020</a:t>
             </a:fld>
             <a:endParaRPr lang="tr-TR"/>
           </a:p>
@@ -771,7 +772,7 @@
           <a:p>
             <a:fld id="{2962A6A9-D976-4BDA-B10C-66B2B9DE9B4C}" type="datetime1">
               <a:rPr lang="tr-TR" smtClean="0"/>
-              <a:t>24.03.2020</a:t>
+              <a:t>30.03.2020</a:t>
             </a:fld>
             <a:endParaRPr lang="tr-TR"/>
           </a:p>
@@ -951,7 +952,7 @@
           <a:p>
             <a:fld id="{5600552A-E4D4-4B40-9929-1D3FB71F71FF}" type="datetime1">
               <a:rPr lang="tr-TR" smtClean="0"/>
-              <a:t>24.03.2020</a:t>
+              <a:t>30.03.2020</a:t>
             </a:fld>
             <a:endParaRPr lang="tr-TR"/>
           </a:p>
@@ -1121,7 +1122,7 @@
           <a:p>
             <a:fld id="{F9A85ECC-3CE4-4AD0-8EC5-3A36763AA76F}" type="datetime1">
               <a:rPr lang="tr-TR" smtClean="0"/>
-              <a:t>24.03.2020</a:t>
+              <a:t>30.03.2020</a:t>
             </a:fld>
             <a:endParaRPr lang="tr-TR"/>
           </a:p>
@@ -1367,7 +1368,7 @@
           <a:p>
             <a:fld id="{39F6AA4B-9646-44CC-B325-B50A183D6636}" type="datetime1">
               <a:rPr lang="tr-TR" smtClean="0"/>
-              <a:t>24.03.2020</a:t>
+              <a:t>30.03.2020</a:t>
             </a:fld>
             <a:endParaRPr lang="tr-TR"/>
           </a:p>
@@ -1599,7 +1600,7 @@
           <a:p>
             <a:fld id="{FD69D89B-A78C-481C-B4BE-82E51E30BA9C}" type="datetime1">
               <a:rPr lang="tr-TR" smtClean="0"/>
-              <a:t>24.03.2020</a:t>
+              <a:t>30.03.2020</a:t>
             </a:fld>
             <a:endParaRPr lang="tr-TR"/>
           </a:p>
@@ -1966,7 +1967,7 @@
           <a:p>
             <a:fld id="{473BE270-57FE-4717-982D-F02DFB5BECD5}" type="datetime1">
               <a:rPr lang="tr-TR" smtClean="0"/>
-              <a:t>24.03.2020</a:t>
+              <a:t>30.03.2020</a:t>
             </a:fld>
             <a:endParaRPr lang="tr-TR"/>
           </a:p>
@@ -2084,7 +2085,7 @@
           <a:p>
             <a:fld id="{BFAEDD45-6991-4862-9E84-DDF92EF341CB}" type="datetime1">
               <a:rPr lang="tr-TR" smtClean="0"/>
-              <a:t>24.03.2020</a:t>
+              <a:t>30.03.2020</a:t>
             </a:fld>
             <a:endParaRPr lang="tr-TR"/>
           </a:p>
@@ -2179,7 +2180,7 @@
           <a:p>
             <a:fld id="{23EE56C6-14E9-4870-96BE-3550760A1300}" type="datetime1">
               <a:rPr lang="tr-TR" smtClean="0"/>
-              <a:t>24.03.2020</a:t>
+              <a:t>30.03.2020</a:t>
             </a:fld>
             <a:endParaRPr lang="tr-TR"/>
           </a:p>
@@ -2456,7 +2457,7 @@
           <a:p>
             <a:fld id="{5EB3015D-7E17-406D-9A1A-3B2ADCD0CF79}" type="datetime1">
               <a:rPr lang="tr-TR" smtClean="0"/>
-              <a:t>24.03.2020</a:t>
+              <a:t>30.03.2020</a:t>
             </a:fld>
             <a:endParaRPr lang="tr-TR"/>
           </a:p>
@@ -2709,7 +2710,7 @@
           <a:p>
             <a:fld id="{8E1B6673-63A0-461F-BFBD-58F4D74CC1A0}" type="datetime1">
               <a:rPr lang="tr-TR" smtClean="0"/>
-              <a:t>24.03.2020</a:t>
+              <a:t>30.03.2020</a:t>
             </a:fld>
             <a:endParaRPr lang="tr-TR"/>
           </a:p>
@@ -2922,7 +2923,7 @@
           <a:p>
             <a:fld id="{9E8EF2ED-7087-4201-9521-97BB02159B09}" type="datetime1">
               <a:rPr lang="tr-TR" smtClean="0"/>
-              <a:t>24.03.2020</a:t>
+              <a:t>30.03.2020</a:t>
             </a:fld>
             <a:endParaRPr lang="tr-TR"/>
           </a:p>
@@ -4637,6 +4638,212 @@
     <p:extLst>
       <p:ext uri="{BB962C8B-B14F-4D97-AF65-F5344CB8AC3E}">
         <p14:creationId xmlns:p14="http://schemas.microsoft.com/office/powerpoint/2010/main" val="1765428756"/>
+      </p:ext>
+    </p:extLst>
+  </p:cSld>
+  <p:clrMapOvr>
+    <a:masterClrMapping/>
+  </p:clrMapOvr>
+  <p:timing>
+    <p:tnLst>
+      <p:par>
+        <p:cTn id="1" dur="indefinite" restart="never" nodeType="tmRoot"/>
+      </p:par>
+    </p:tnLst>
+  </p:timing>
+</p:sld>
+</file>
+
+<file path=ppt/slides/slide7.xml><?xml version="1.0" encoding="utf-8"?>
+<p:sld xmlns:a="http://schemas.openxmlformats.org/drawingml/2006/main" xmlns:r="http://schemas.openxmlformats.org/officeDocument/2006/relationships" xmlns:p="http://schemas.openxmlformats.org/presentationml/2006/main">
+  <p:cSld>
+    <p:spTree>
+      <p:nvGrpSpPr>
+        <p:cNvPr id="1" name=""/>
+        <p:cNvGrpSpPr/>
+        <p:nvPr/>
+      </p:nvGrpSpPr>
+      <p:grpSpPr>
+        <a:xfrm>
+          <a:off x="0" y="0"/>
+          <a:ext cx="0" cy="0"/>
+          <a:chOff x="0" y="0"/>
+          <a:chExt cx="0" cy="0"/>
+        </a:xfrm>
+      </p:grpSpPr>
+      <p:sp>
+        <p:nvSpPr>
+          <p:cNvPr id="4" name="Slide Number Placeholder 3"/>
+          <p:cNvSpPr>
+            <a:spLocks noGrp="1"/>
+          </p:cNvSpPr>
+          <p:nvPr>
+            <p:ph type="sldNum" sz="quarter" idx="12"/>
+          </p:nvPr>
+        </p:nvSpPr>
+        <p:spPr/>
+        <p:txBody>
+          <a:bodyPr/>
+          <a:lstStyle/>
+          <a:p>
+            <a:fld id="{178508F5-8E49-4F57-B165-331DE2AB85B8}" type="slidenum">
+              <a:rPr lang="tr-TR" sz="1800" smtClean="0"/>
+              <a:t>7</a:t>
+            </a:fld>
+            <a:endParaRPr lang="tr-TR" sz="1800" dirty="0"/>
+          </a:p>
+        </p:txBody>
+      </p:sp>
+      <p:sp>
+        <p:nvSpPr>
+          <p:cNvPr id="19" name="TextBox 18"/>
+          <p:cNvSpPr txBox="1"/>
+          <p:nvPr/>
+        </p:nvSpPr>
+        <p:spPr>
+          <a:xfrm>
+            <a:off x="110836" y="46086"/>
+            <a:ext cx="2374670" cy="369332"/>
+          </a:xfrm>
+          <a:prstGeom prst="rect">
+            <a:avLst/>
+          </a:prstGeom>
+          <a:noFill/>
+        </p:spPr>
+        <p:txBody>
+          <a:bodyPr wrap="square" rtlCol="0">
+            <a:spAutoFit/>
+          </a:bodyPr>
+          <a:lstStyle/>
+          <a:p>
+            <a:pPr algn="ctr"/>
+            <a:r>
+              <a:rPr lang="tr-TR" b="1" dirty="0" smtClean="0"/>
+              <a:t>Thesis Outline</a:t>
+            </a:r>
+            <a:endParaRPr lang="tr-TR" b="1" dirty="0"/>
+          </a:p>
+        </p:txBody>
+      </p:sp>
+      <p:sp>
+        <p:nvSpPr>
+          <p:cNvPr id="5" name="TextBox 4"/>
+          <p:cNvSpPr txBox="1"/>
+          <p:nvPr/>
+        </p:nvSpPr>
+        <p:spPr>
+          <a:xfrm>
+            <a:off x="581890" y="698269"/>
+            <a:ext cx="10324407" cy="3000821"/>
+          </a:xfrm>
+          <a:prstGeom prst="rect">
+            <a:avLst/>
+          </a:prstGeom>
+          <a:noFill/>
+        </p:spPr>
+        <p:txBody>
+          <a:bodyPr wrap="square" rtlCol="0">
+            <a:spAutoFit/>
+          </a:bodyPr>
+          <a:lstStyle/>
+          <a:p>
+            <a:pPr marL="285750" indent="-285750">
+              <a:lnSpc>
+                <a:spcPct val="150000"/>
+              </a:lnSpc>
+              <a:buFont typeface="Arial" panose="020B0604020202020204" pitchFamily="34" charset="0"/>
+              <a:buChar char="•"/>
+            </a:pPr>
+            <a:r>
+              <a:rPr lang="tr-TR" dirty="0" smtClean="0"/>
+              <a:t>Introduction</a:t>
+            </a:r>
+          </a:p>
+          <a:p>
+            <a:pPr marL="285750" indent="-285750">
+              <a:lnSpc>
+                <a:spcPct val="150000"/>
+              </a:lnSpc>
+              <a:buFont typeface="Arial" panose="020B0604020202020204" pitchFamily="34" charset="0"/>
+              <a:buChar char="•"/>
+            </a:pPr>
+            <a:r>
+              <a:rPr lang="tr-TR" dirty="0" smtClean="0"/>
+              <a:t>Gate Charge Characterization (EPFL, TPEL), Output Capacitance Characterization (Göksu + Enes)</a:t>
+            </a:r>
+          </a:p>
+          <a:p>
+            <a:pPr marL="285750" indent="-285750">
+              <a:lnSpc>
+                <a:spcPct val="150000"/>
+              </a:lnSpc>
+              <a:buFont typeface="Arial" panose="020B0604020202020204" pitchFamily="34" charset="0"/>
+              <a:buChar char="•"/>
+            </a:pPr>
+            <a:r>
+              <a:rPr lang="tr-TR" dirty="0" smtClean="0"/>
+              <a:t>Modelling and Switching Characteristics (EPE + ECCE)</a:t>
+            </a:r>
+          </a:p>
+          <a:p>
+            <a:pPr marL="285750" indent="-285750">
+              <a:lnSpc>
+                <a:spcPct val="150000"/>
+              </a:lnSpc>
+              <a:buFont typeface="Arial" panose="020B0604020202020204" pitchFamily="34" charset="0"/>
+              <a:buChar char="•"/>
+            </a:pPr>
+            <a:r>
+              <a:rPr lang="tr-TR" dirty="0" smtClean="0"/>
+              <a:t>Half-Bridge Design, Layout, SC, Paralleling (TPEL)</a:t>
+            </a:r>
+          </a:p>
+          <a:p>
+            <a:pPr marL="285750" indent="-285750">
+              <a:lnSpc>
+                <a:spcPct val="150000"/>
+              </a:lnSpc>
+              <a:buFont typeface="Arial" panose="020B0604020202020204" pitchFamily="34" charset="0"/>
+              <a:buChar char="•"/>
+            </a:pPr>
+            <a:r>
+              <a:rPr lang="tr-TR" dirty="0" smtClean="0"/>
+              <a:t>DC/DC Converter Design (TPEL)</a:t>
+            </a:r>
+          </a:p>
+          <a:p>
+            <a:pPr marL="285750" indent="-285750">
+              <a:lnSpc>
+                <a:spcPct val="150000"/>
+              </a:lnSpc>
+              <a:buFont typeface="Arial" panose="020B0604020202020204" pitchFamily="34" charset="0"/>
+              <a:buChar char="•"/>
+            </a:pPr>
+            <a:r>
+              <a:rPr lang="tr-TR" dirty="0" smtClean="0"/>
+              <a:t>5-ph Inverter Design (Optional ?)</a:t>
+            </a:r>
+          </a:p>
+          <a:p>
+            <a:pPr marL="285750" indent="-285750">
+              <a:lnSpc>
+                <a:spcPct val="150000"/>
+              </a:lnSpc>
+              <a:buFont typeface="Arial" panose="020B0604020202020204" pitchFamily="34" charset="0"/>
+              <a:buChar char="•"/>
+            </a:pPr>
+            <a:r>
+              <a:rPr lang="tr-TR" dirty="0" smtClean="0"/>
+              <a:t>Conclusion</a:t>
+            </a:r>
+            <a:endParaRPr lang="tr-TR" dirty="0"/>
+          </a:p>
+        </p:txBody>
+      </p:sp>
+    </p:spTree>
+    <p:extLst>
+      <p:ext uri="{BB962C8B-B14F-4D97-AF65-F5344CB8AC3E}">
+        <p14:creationId xmlns:p14="http://schemas.microsoft.com/office/powerpoint/2010/main" val="4098610988"/>
       </p:ext>
     </p:extLst>
   </p:cSld>

</xml_diff>